<commit_message>
Stichpunkte folie zu Lastenheft in PP
</commit_message>
<xml_diff>
--- a/PocketCoachExcel-PDF/PowerPoints/PocketCoach.pptx
+++ b/PocketCoachExcel-PDF/PowerPoints/PocketCoach.pptx
@@ -5,7 +5,7 @@
     <p:sldMasterId id="2147483660" r:id="rId1"/>
   </p:sldMasterIdLst>
   <p:notesMasterIdLst>
-    <p:notesMasterId r:id="rId15"/>
+    <p:notesMasterId r:id="rId16"/>
   </p:notesMasterIdLst>
   <p:sldIdLst>
     <p:sldId id="256" r:id="rId2"/>
@@ -19,8 +19,9 @@
     <p:sldId id="267" r:id="rId10"/>
     <p:sldId id="263" r:id="rId11"/>
     <p:sldId id="260" r:id="rId12"/>
-    <p:sldId id="261" r:id="rId13"/>
-    <p:sldId id="262" r:id="rId14"/>
+    <p:sldId id="273" r:id="rId13"/>
+    <p:sldId id="261" r:id="rId14"/>
+    <p:sldId id="262" r:id="rId15"/>
   </p:sldIdLst>
   <p:sldSz cx="12192000" cy="6858000"/>
   <p:notesSz cx="6858000" cy="9144000"/>
@@ -209,7 +210,7 @@
           <a:p>
             <a:fld id="{876C7EC8-880A-DF4F-BED9-A1919BEA3339}" type="datetimeFigureOut">
               <a:rPr lang="de-DE" smtClean="0"/>
-              <a:t>06.11.20</a:t>
+              <a:t>07.11.20</a:t>
             </a:fld>
             <a:endParaRPr lang="de-DE"/>
           </a:p>
@@ -1517,6 +1518,90 @@
     <p:extLst>
       <p:ext uri="{BB962C8B-B14F-4D97-AF65-F5344CB8AC3E}">
         <p14:creationId xmlns:p14="http://schemas.microsoft.com/office/powerpoint/2010/main" val="2719721182"/>
+      </p:ext>
+    </p:extLst>
+  </p:cSld>
+  <p:clrMapOvr>
+    <a:masterClrMapping/>
+  </p:clrMapOvr>
+</p:notes>
+</file>
+
+<file path=ppt/notesSlides/notesSlide9.xml><?xml version="1.0" encoding="utf-8"?>
+<p:notes xmlns:a="http://schemas.openxmlformats.org/drawingml/2006/main" xmlns:r="http://schemas.openxmlformats.org/officeDocument/2006/relationships" xmlns:p="http://schemas.openxmlformats.org/presentationml/2006/main">
+  <p:cSld>
+    <p:spTree>
+      <p:nvGrpSpPr>
+        <p:cNvPr id="1" name=""/>
+        <p:cNvGrpSpPr/>
+        <p:nvPr/>
+      </p:nvGrpSpPr>
+      <p:grpSpPr>
+        <a:xfrm>
+          <a:off x="0" y="0"/>
+          <a:ext cx="0" cy="0"/>
+          <a:chOff x="0" y="0"/>
+          <a:chExt cx="0" cy="0"/>
+        </a:xfrm>
+      </p:grpSpPr>
+      <p:sp>
+        <p:nvSpPr>
+          <p:cNvPr id="2" name="Folienbildplatzhalter 1"/>
+          <p:cNvSpPr>
+            <a:spLocks noGrp="1" noRot="1" noChangeAspect="1"/>
+          </p:cNvSpPr>
+          <p:nvPr>
+            <p:ph type="sldImg"/>
+          </p:nvPr>
+        </p:nvSpPr>
+        <p:spPr/>
+      </p:sp>
+      <p:sp>
+        <p:nvSpPr>
+          <p:cNvPr id="3" name="Notizenplatzhalter 2"/>
+          <p:cNvSpPr>
+            <a:spLocks noGrp="1"/>
+          </p:cNvSpPr>
+          <p:nvPr>
+            <p:ph type="body" idx="1"/>
+          </p:nvPr>
+        </p:nvSpPr>
+        <p:spPr/>
+        <p:txBody>
+          <a:bodyPr/>
+          <a:lstStyle/>
+          <a:p>
+            <a:endParaRPr lang="de-DE" dirty="0"/>
+          </a:p>
+        </p:txBody>
+      </p:sp>
+      <p:sp>
+        <p:nvSpPr>
+          <p:cNvPr id="4" name="Foliennummernplatzhalter 3"/>
+          <p:cNvSpPr>
+            <a:spLocks noGrp="1"/>
+          </p:cNvSpPr>
+          <p:nvPr>
+            <p:ph type="sldNum" sz="quarter" idx="5"/>
+          </p:nvPr>
+        </p:nvSpPr>
+        <p:spPr/>
+        <p:txBody>
+          <a:bodyPr/>
+          <a:lstStyle/>
+          <a:p>
+            <a:fld id="{7023F634-3B75-3C42-9B21-44E0DAFB93BE}" type="slidenum">
+              <a:rPr lang="de-DE" smtClean="0"/>
+              <a:t>12</a:t>
+            </a:fld>
+            <a:endParaRPr lang="de-DE"/>
+          </a:p>
+        </p:txBody>
+      </p:sp>
+    </p:spTree>
+    <p:extLst>
+      <p:ext uri="{BB962C8B-B14F-4D97-AF65-F5344CB8AC3E}">
+        <p14:creationId xmlns:p14="http://schemas.microsoft.com/office/powerpoint/2010/main" val="1548333508"/>
       </p:ext>
     </p:extLst>
   </p:cSld>
@@ -2248,7 +2333,7 @@
           <a:p>
             <a:fld id="{05398259-13D8-49B1-995A-833CACEE6A13}" type="datetimeFigureOut">
               <a:rPr lang="de-DE" smtClean="0"/>
-              <a:t>06.11.20</a:t>
+              <a:t>07.11.20</a:t>
             </a:fld>
             <a:endParaRPr lang="de-DE"/>
           </a:p>
@@ -2499,7 +2584,7 @@
           <a:p>
             <a:fld id="{05398259-13D8-49B1-995A-833CACEE6A13}" type="datetimeFigureOut">
               <a:rPr lang="de-DE" smtClean="0"/>
-              <a:t>06.11.20</a:t>
+              <a:t>07.11.20</a:t>
             </a:fld>
             <a:endParaRPr lang="de-DE"/>
           </a:p>
@@ -2813,7 +2898,7 @@
           <a:p>
             <a:fld id="{05398259-13D8-49B1-995A-833CACEE6A13}" type="datetimeFigureOut">
               <a:rPr lang="de-DE" smtClean="0"/>
-              <a:t>06.11.20</a:t>
+              <a:t>07.11.20</a:t>
             </a:fld>
             <a:endParaRPr lang="de-DE"/>
           </a:p>
@@ -3154,7 +3239,7 @@
           <a:p>
             <a:fld id="{05398259-13D8-49B1-995A-833CACEE6A13}" type="datetimeFigureOut">
               <a:rPr lang="de-DE" smtClean="0"/>
-              <a:t>06.11.20</a:t>
+              <a:t>07.11.20</a:t>
             </a:fld>
             <a:endParaRPr lang="de-DE"/>
           </a:p>
@@ -3468,7 +3553,7 @@
           <a:p>
             <a:fld id="{05398259-13D8-49B1-995A-833CACEE6A13}" type="datetimeFigureOut">
               <a:rPr lang="de-DE" smtClean="0"/>
-              <a:t>06.11.20</a:t>
+              <a:t>07.11.20</a:t>
             </a:fld>
             <a:endParaRPr lang="de-DE"/>
           </a:p>
@@ -3861,7 +3946,7 @@
           <a:p>
             <a:fld id="{05398259-13D8-49B1-995A-833CACEE6A13}" type="datetimeFigureOut">
               <a:rPr lang="de-DE" smtClean="0"/>
-              <a:t>06.11.20</a:t>
+              <a:t>07.11.20</a:t>
             </a:fld>
             <a:endParaRPr lang="de-DE"/>
           </a:p>
@@ -4031,7 +4116,7 @@
           <a:p>
             <a:fld id="{05398259-13D8-49B1-995A-833CACEE6A13}" type="datetimeFigureOut">
               <a:rPr lang="de-DE" smtClean="0"/>
-              <a:t>06.11.20</a:t>
+              <a:t>07.11.20</a:t>
             </a:fld>
             <a:endParaRPr lang="de-DE"/>
           </a:p>
@@ -4211,7 +4296,7 @@
           <a:p>
             <a:fld id="{05398259-13D8-49B1-995A-833CACEE6A13}" type="datetimeFigureOut">
               <a:rPr lang="de-DE" smtClean="0"/>
-              <a:t>06.11.20</a:t>
+              <a:t>07.11.20</a:t>
             </a:fld>
             <a:endParaRPr lang="de-DE"/>
           </a:p>
@@ -4387,7 +4472,7 @@
           <a:p>
             <a:fld id="{05398259-13D8-49B1-995A-833CACEE6A13}" type="datetimeFigureOut">
               <a:rPr lang="de-DE" smtClean="0"/>
-              <a:t>06.11.20</a:t>
+              <a:t>07.11.20</a:t>
             </a:fld>
             <a:endParaRPr lang="de-DE"/>
           </a:p>
@@ -4634,7 +4719,7 @@
           <a:p>
             <a:fld id="{05398259-13D8-49B1-995A-833CACEE6A13}" type="datetimeFigureOut">
               <a:rPr lang="de-DE" smtClean="0"/>
-              <a:t>06.11.20</a:t>
+              <a:t>07.11.20</a:t>
             </a:fld>
             <a:endParaRPr lang="de-DE"/>
           </a:p>
@@ -4866,7 +4951,7 @@
           <a:p>
             <a:fld id="{05398259-13D8-49B1-995A-833CACEE6A13}" type="datetimeFigureOut">
               <a:rPr lang="de-DE" smtClean="0"/>
-              <a:t>06.11.20</a:t>
+              <a:t>07.11.20</a:t>
             </a:fld>
             <a:endParaRPr lang="de-DE"/>
           </a:p>
@@ -5240,7 +5325,7 @@
           <a:p>
             <a:fld id="{05398259-13D8-49B1-995A-833CACEE6A13}" type="datetimeFigureOut">
               <a:rPr lang="de-DE" smtClean="0"/>
-              <a:t>06.11.20</a:t>
+              <a:t>07.11.20</a:t>
             </a:fld>
             <a:endParaRPr lang="de-DE"/>
           </a:p>
@@ -5363,7 +5448,7 @@
           <a:p>
             <a:fld id="{05398259-13D8-49B1-995A-833CACEE6A13}" type="datetimeFigureOut">
               <a:rPr lang="de-DE" smtClean="0"/>
-              <a:t>06.11.20</a:t>
+              <a:t>07.11.20</a:t>
             </a:fld>
             <a:endParaRPr lang="de-DE"/>
           </a:p>
@@ -5458,7 +5543,7 @@
           <a:p>
             <a:fld id="{05398259-13D8-49B1-995A-833CACEE6A13}" type="datetimeFigureOut">
               <a:rPr lang="de-DE" smtClean="0"/>
-              <a:t>06.11.20</a:t>
+              <a:t>07.11.20</a:t>
             </a:fld>
             <a:endParaRPr lang="de-DE"/>
           </a:p>
@@ -5713,7 +5798,7 @@
           <a:p>
             <a:fld id="{05398259-13D8-49B1-995A-833CACEE6A13}" type="datetimeFigureOut">
               <a:rPr lang="de-DE" smtClean="0"/>
-              <a:t>06.11.20</a:t>
+              <a:t>07.11.20</a:t>
             </a:fld>
             <a:endParaRPr lang="de-DE"/>
           </a:p>
@@ -5976,7 +6061,7 @@
           <a:p>
             <a:fld id="{05398259-13D8-49B1-995A-833CACEE6A13}" type="datetimeFigureOut">
               <a:rPr lang="de-DE" smtClean="0"/>
-              <a:t>06.11.20</a:t>
+              <a:t>07.11.20</a:t>
             </a:fld>
             <a:endParaRPr lang="de-DE"/>
           </a:p>
@@ -6719,7 +6804,7 @@
           <a:p>
             <a:fld id="{05398259-13D8-49B1-995A-833CACEE6A13}" type="datetimeFigureOut">
               <a:rPr lang="de-DE" smtClean="0"/>
-              <a:t>06.11.20</a:t>
+              <a:t>07.11.20</a:t>
             </a:fld>
             <a:endParaRPr lang="de-DE"/>
           </a:p>
@@ -7930,34 +8015,6 @@
           </a:p>
         </p:txBody>
       </p:sp>
-      <p:sp>
-        <p:nvSpPr>
-          <p:cNvPr id="3" name="Inhaltsplatzhalter 2">
-            <a:extLst>
-              <a:ext uri="{FF2B5EF4-FFF2-40B4-BE49-F238E27FC236}">
-                <a16:creationId xmlns:a16="http://schemas.microsoft.com/office/drawing/2014/main" id="{FCDCEEBD-68DF-4924-8A41-91582416FA35}"/>
-              </a:ext>
-            </a:extLst>
-          </p:cNvPr>
-          <p:cNvSpPr>
-            <a:spLocks noGrp="1"/>
-          </p:cNvSpPr>
-          <p:nvPr>
-            <p:ph idx="1"/>
-          </p:nvPr>
-        </p:nvSpPr>
-        <p:spPr/>
-        <p:txBody>
-          <a:bodyPr/>
-          <a:lstStyle/>
-          <a:p>
-            <a:pPr marL="0" indent="0">
-              <a:buNone/>
-            </a:pPr>
-            <a:endParaRPr lang="de-DE" dirty="0"/>
-          </a:p>
-        </p:txBody>
-      </p:sp>
       <p:pic>
         <p:nvPicPr>
           <p:cNvPr id="5" name="Grafik 4">
@@ -8032,6 +8089,72 @@
           </a:prstGeom>
         </p:spPr>
       </p:pic>
+      <p:pic>
+        <p:nvPicPr>
+          <p:cNvPr id="8" name="Grafik 7" descr="Ein Bild, das Tisch enthält.&#10;&#10;Automatisch generierte Beschreibung">
+            <a:extLst>
+              <a:ext uri="{FF2B5EF4-FFF2-40B4-BE49-F238E27FC236}">
+                <a16:creationId xmlns:a16="http://schemas.microsoft.com/office/drawing/2014/main" id="{79FA558F-5163-7648-840E-3C4010AED48B}"/>
+              </a:ext>
+            </a:extLst>
+          </p:cNvPr>
+          <p:cNvPicPr>
+            <a:picLocks noChangeAspect="1"/>
+          </p:cNvPicPr>
+          <p:nvPr/>
+        </p:nvPicPr>
+        <p:blipFill>
+          <a:blip r:embed="rId4">
+            <a:extLst>
+              <a:ext uri="{28A0092B-C50C-407E-A947-70E740481C1C}">
+                <a14:useLocalDpi xmlns:a14="http://schemas.microsoft.com/office/drawing/2010/main" val="0"/>
+              </a:ext>
+            </a:extLst>
+          </a:blip>
+          <a:stretch>
+            <a:fillRect/>
+          </a:stretch>
+        </p:blipFill>
+        <p:spPr>
+          <a:xfrm>
+            <a:off x="1160408" y="1930400"/>
+            <a:ext cx="7630519" cy="5148620"/>
+          </a:xfrm>
+          <a:prstGeom prst="rect">
+            <a:avLst/>
+          </a:prstGeom>
+          <a:solidFill>
+            <a:srgbClr val="FFFFFF">
+              <a:shade val="85000"/>
+            </a:srgbClr>
+          </a:solidFill>
+          <a:ln w="88900" cap="sq">
+            <a:solidFill>
+              <a:srgbClr val="FFFFFF"/>
+            </a:solidFill>
+            <a:miter lim="800000"/>
+          </a:ln>
+          <a:effectLst>
+            <a:outerShdw blurRad="50800" dist="38100" dir="13500000" algn="br" rotWithShape="0">
+              <a:prstClr val="black">
+                <a:alpha val="40000"/>
+              </a:prstClr>
+            </a:outerShdw>
+          </a:effectLst>
+          <a:scene3d>
+            <a:camera prst="orthographicFront"/>
+            <a:lightRig rig="twoPt" dir="t">
+              <a:rot lat="0" lon="0" rev="7200000"/>
+            </a:lightRig>
+          </a:scene3d>
+          <a:sp3d>
+            <a:bevelT w="25400" h="19050"/>
+            <a:contourClr>
+              <a:srgbClr val="FFFFFF"/>
+            </a:contourClr>
+          </a:sp3d>
+        </p:spPr>
+      </p:pic>
     </p:spTree>
     <p:extLst>
       <p:ext uri="{BB962C8B-B14F-4D97-AF65-F5344CB8AC3E}">
@@ -8046,6 +8169,324 @@
 </file>
 
 <file path=ppt/slides/slide12.xml><?xml version="1.0" encoding="utf-8"?>
+<p:sld xmlns:a="http://schemas.openxmlformats.org/drawingml/2006/main" xmlns:r="http://schemas.openxmlformats.org/officeDocument/2006/relationships" xmlns:p="http://schemas.openxmlformats.org/presentationml/2006/main">
+  <p:cSld>
+    <p:spTree>
+      <p:nvGrpSpPr>
+        <p:cNvPr id="1" name=""/>
+        <p:cNvGrpSpPr/>
+        <p:nvPr/>
+      </p:nvGrpSpPr>
+      <p:grpSpPr>
+        <a:xfrm>
+          <a:off x="0" y="0"/>
+          <a:ext cx="0" cy="0"/>
+          <a:chOff x="0" y="0"/>
+          <a:chExt cx="0" cy="0"/>
+        </a:xfrm>
+      </p:grpSpPr>
+      <p:sp>
+        <p:nvSpPr>
+          <p:cNvPr id="2" name="Titel 1">
+            <a:extLst>
+              <a:ext uri="{FF2B5EF4-FFF2-40B4-BE49-F238E27FC236}">
+                <a16:creationId xmlns:a16="http://schemas.microsoft.com/office/drawing/2014/main" id="{0F09C5DB-EA82-4F84-A170-C8D7412D4EE0}"/>
+              </a:ext>
+            </a:extLst>
+          </p:cNvPr>
+          <p:cNvSpPr>
+            <a:spLocks noGrp="1"/>
+          </p:cNvSpPr>
+          <p:nvPr>
+            <p:ph type="title"/>
+          </p:nvPr>
+        </p:nvSpPr>
+        <p:spPr/>
+        <p:txBody>
+          <a:bodyPr/>
+          <a:lstStyle/>
+          <a:p>
+            <a:pPr algn="ctr"/>
+            <a:r>
+              <a:rPr lang="de-DE" dirty="0"/>
+              <a:t>Lastenheft</a:t>
+            </a:r>
+          </a:p>
+        </p:txBody>
+      </p:sp>
+      <p:pic>
+        <p:nvPicPr>
+          <p:cNvPr id="5" name="Grafik 4">
+            <a:extLst>
+              <a:ext uri="{FF2B5EF4-FFF2-40B4-BE49-F238E27FC236}">
+                <a16:creationId xmlns:a16="http://schemas.microsoft.com/office/drawing/2014/main" id="{7D260344-23DD-4348-A2A1-C8A2EF22687F}"/>
+              </a:ext>
+            </a:extLst>
+          </p:cNvPr>
+          <p:cNvPicPr>
+            <a:picLocks noChangeAspect="1"/>
+          </p:cNvPicPr>
+          <p:nvPr/>
+        </p:nvPicPr>
+        <p:blipFill rotWithShape="1">
+          <a:blip r:embed="rId3" cstate="print">
+            <a:extLst>
+              <a:ext uri="{28A0092B-C50C-407E-A947-70E740481C1C}">
+                <a14:useLocalDpi xmlns:a14="http://schemas.microsoft.com/office/drawing/2010/main" val="0"/>
+              </a:ext>
+            </a:extLst>
+          </a:blip>
+          <a:srcRect l="11774" t="14019" r="12142" b="11639"/>
+          <a:stretch/>
+        </p:blipFill>
+        <p:spPr bwMode="auto">
+          <a:xfrm>
+            <a:off x="10401302" y="104775"/>
+            <a:ext cx="1678020" cy="1440000"/>
+          </a:xfrm>
+          <a:prstGeom prst="rect">
+            <a:avLst/>
+          </a:prstGeom>
+          <a:noFill/>
+          <a:ln>
+            <a:noFill/>
+          </a:ln>
+        </p:spPr>
+      </p:pic>
+      <p:pic>
+        <p:nvPicPr>
+          <p:cNvPr id="11" name="Grafik 10">
+            <a:extLst>
+              <a:ext uri="{FF2B5EF4-FFF2-40B4-BE49-F238E27FC236}">
+                <a16:creationId xmlns:a16="http://schemas.microsoft.com/office/drawing/2014/main" id="{BDE6FB44-65FD-4E2B-BE99-975EFC3E58BC}"/>
+              </a:ext>
+            </a:extLst>
+          </p:cNvPr>
+          <p:cNvPicPr>
+            <a:picLocks noChangeAspect="1"/>
+          </p:cNvPicPr>
+          <p:nvPr/>
+        </p:nvPicPr>
+        <p:blipFill rotWithShape="1">
+          <a:blip r:embed="rId4">
+            <a:extLst>
+              <a:ext uri="{28A0092B-C50C-407E-A947-70E740481C1C}">
+                <a14:useLocalDpi xmlns:a14="http://schemas.microsoft.com/office/drawing/2010/main" val="0"/>
+              </a:ext>
+            </a:extLst>
+          </a:blip>
+          <a:srcRect l="6667" t="9360" r="47917" b="29306"/>
+          <a:stretch/>
+        </p:blipFill>
+        <p:spPr>
+          <a:xfrm>
+            <a:off x="112678" y="104775"/>
+            <a:ext cx="1421712" cy="1440000"/>
+          </a:xfrm>
+          <a:prstGeom prst="rect">
+            <a:avLst/>
+          </a:prstGeom>
+        </p:spPr>
+      </p:pic>
+      <p:pic>
+        <p:nvPicPr>
+          <p:cNvPr id="8" name="Grafik 7" descr="Ein Bild, das Tisch enthält.&#10;&#10;Automatisch generierte Beschreibung">
+            <a:extLst>
+              <a:ext uri="{FF2B5EF4-FFF2-40B4-BE49-F238E27FC236}">
+                <a16:creationId xmlns:a16="http://schemas.microsoft.com/office/drawing/2014/main" id="{79FA558F-5163-7648-840E-3C4010AED48B}"/>
+              </a:ext>
+            </a:extLst>
+          </p:cNvPr>
+          <p:cNvPicPr>
+            <a:picLocks noChangeAspect="1"/>
+          </p:cNvPicPr>
+          <p:nvPr/>
+        </p:nvPicPr>
+        <p:blipFill rotWithShape="1">
+          <a:blip r:embed="rId5">
+            <a:extLst>
+              <a:ext uri="{28A0092B-C50C-407E-A947-70E740481C1C}">
+                <a14:useLocalDpi xmlns:a14="http://schemas.microsoft.com/office/drawing/2010/main" val="0"/>
+              </a:ext>
+            </a:extLst>
+          </a:blip>
+          <a:srcRect l="1" r="26727"/>
+          <a:stretch/>
+        </p:blipFill>
+        <p:spPr>
+          <a:xfrm>
+            <a:off x="1160409" y="1930400"/>
+            <a:ext cx="5591148" cy="5148620"/>
+          </a:xfrm>
+          <a:prstGeom prst="rect">
+            <a:avLst/>
+          </a:prstGeom>
+          <a:solidFill>
+            <a:srgbClr val="FFFFFF">
+              <a:shade val="85000"/>
+            </a:srgbClr>
+          </a:solidFill>
+          <a:ln w="88900" cap="sq">
+            <a:solidFill>
+              <a:srgbClr val="FFFFFF"/>
+            </a:solidFill>
+            <a:miter lim="800000"/>
+          </a:ln>
+          <a:effectLst>
+            <a:outerShdw blurRad="50800" dist="38100" dir="13500000" algn="br" rotWithShape="0">
+              <a:prstClr val="black">
+                <a:alpha val="40000"/>
+              </a:prstClr>
+            </a:outerShdw>
+          </a:effectLst>
+          <a:scene3d>
+            <a:camera prst="orthographicFront"/>
+            <a:lightRig rig="twoPt" dir="t">
+              <a:rot lat="0" lon="0" rev="7200000"/>
+            </a:lightRig>
+          </a:scene3d>
+          <a:sp3d>
+            <a:bevelT w="25400" h="19050"/>
+            <a:contourClr>
+              <a:srgbClr val="FFFFFF"/>
+            </a:contourClr>
+          </a:sp3d>
+        </p:spPr>
+      </p:pic>
+      <p:sp>
+        <p:nvSpPr>
+          <p:cNvPr id="6" name="Trapez 5">
+            <a:extLst>
+              <a:ext uri="{FF2B5EF4-FFF2-40B4-BE49-F238E27FC236}">
+                <a16:creationId xmlns:a16="http://schemas.microsoft.com/office/drawing/2014/main" id="{B621BD38-7592-D14D-8567-3A75E531E6D9}"/>
+              </a:ext>
+            </a:extLst>
+          </p:cNvPr>
+          <p:cNvSpPr/>
+          <p:nvPr/>
+        </p:nvSpPr>
+        <p:spPr>
+          <a:xfrm rot="16200000">
+            <a:off x="2805343" y="3811786"/>
+            <a:ext cx="5910893" cy="2057396"/>
+          </a:xfrm>
+          <a:prstGeom prst="trapezoid">
+            <a:avLst/>
+          </a:prstGeom>
+          <a:ln>
+            <a:noFill/>
+          </a:ln>
+          <a:effectLst>
+            <a:outerShdw blurRad="50800" dist="38100" dir="13500000" algn="br" rotWithShape="0">
+              <a:prstClr val="black">
+                <a:alpha val="40000"/>
+              </a:prstClr>
+            </a:outerShdw>
+          </a:effectLst>
+        </p:spPr>
+        <p:style>
+          <a:lnRef idx="2">
+            <a:schemeClr val="accent6"/>
+          </a:lnRef>
+          <a:fillRef idx="1">
+            <a:schemeClr val="lt1"/>
+          </a:fillRef>
+          <a:effectRef idx="0">
+            <a:schemeClr val="accent6"/>
+          </a:effectRef>
+          <a:fontRef idx="minor">
+            <a:schemeClr val="dk1"/>
+          </a:fontRef>
+        </p:style>
+        <p:txBody>
+          <a:bodyPr rtlCol="0" anchor="ctr"/>
+          <a:lstStyle/>
+          <a:p>
+            <a:pPr algn="ctr"/>
+            <a:endParaRPr lang="de-DE"/>
+          </a:p>
+        </p:txBody>
+      </p:sp>
+      <p:sp>
+        <p:nvSpPr>
+          <p:cNvPr id="7" name="Inhaltsplatzhalter 5">
+            <a:extLst>
+              <a:ext uri="{FF2B5EF4-FFF2-40B4-BE49-F238E27FC236}">
+                <a16:creationId xmlns:a16="http://schemas.microsoft.com/office/drawing/2014/main" id="{11B67E43-333E-BF47-B1FB-B09C9FC5FE99}"/>
+              </a:ext>
+            </a:extLst>
+          </p:cNvPr>
+          <p:cNvSpPr>
+            <a:spLocks noGrp="1"/>
+          </p:cNvSpPr>
+          <p:nvPr>
+            <p:ph idx="1"/>
+          </p:nvPr>
+        </p:nvSpPr>
+        <p:spPr>
+          <a:xfrm>
+            <a:off x="6867557" y="2435225"/>
+            <a:ext cx="2406445" cy="3172218"/>
+          </a:xfrm>
+        </p:spPr>
+        <p:txBody>
+          <a:bodyPr>
+            <a:normAutofit/>
+          </a:bodyPr>
+          <a:lstStyle/>
+          <a:p>
+            <a:r>
+              <a:rPr lang="de-DE" dirty="0"/>
+              <a:t>Anforderungen</a:t>
+            </a:r>
+          </a:p>
+          <a:p>
+            <a:pPr marL="0" indent="0">
+              <a:buNone/>
+            </a:pPr>
+            <a:endParaRPr lang="de-DE" dirty="0"/>
+          </a:p>
+          <a:p>
+            <a:pPr lvl="1"/>
+            <a:r>
+              <a:rPr lang="de-DE" dirty="0"/>
+              <a:t>Hardware</a:t>
+            </a:r>
+          </a:p>
+          <a:p>
+            <a:pPr lvl="1"/>
+            <a:r>
+              <a:rPr lang="de-DE" dirty="0" err="1"/>
+              <a:t>Wearable</a:t>
+            </a:r>
+            <a:endParaRPr lang="de-DE" dirty="0"/>
+          </a:p>
+          <a:p>
+            <a:pPr lvl="1"/>
+            <a:r>
+              <a:rPr lang="de-DE" dirty="0"/>
+              <a:t>App</a:t>
+            </a:r>
+          </a:p>
+          <a:p>
+            <a:endParaRPr lang="de-DE" dirty="0"/>
+          </a:p>
+        </p:txBody>
+      </p:sp>
+    </p:spTree>
+    <p:extLst>
+      <p:ext uri="{BB962C8B-B14F-4D97-AF65-F5344CB8AC3E}">
+        <p14:creationId xmlns:p14="http://schemas.microsoft.com/office/powerpoint/2010/main" val="2770706068"/>
+      </p:ext>
+    </p:extLst>
+  </p:cSld>
+  <p:clrMapOvr>
+    <a:masterClrMapping/>
+  </p:clrMapOvr>
+</p:sld>
+</file>
+
+<file path=ppt/slides/slide13.xml><?xml version="1.0" encoding="utf-8"?>
 <p:sld xmlns:a="http://schemas.openxmlformats.org/drawingml/2006/main" xmlns:r="http://schemas.openxmlformats.org/officeDocument/2006/relationships" xmlns:p="http://schemas.openxmlformats.org/presentationml/2006/main">
   <p:cSld>
     <p:spTree>
@@ -8531,7 +8972,7 @@
 </p:sld>
 </file>
 
-<file path=ppt/slides/slide13.xml><?xml version="1.0" encoding="utf-8"?>
+<file path=ppt/slides/slide14.xml><?xml version="1.0" encoding="utf-8"?>
 <p:sld xmlns:a="http://schemas.openxmlformats.org/drawingml/2006/main" xmlns:r="http://schemas.openxmlformats.org/officeDocument/2006/relationships" xmlns:p="http://schemas.openxmlformats.org/presentationml/2006/main">
   <p:cSld>
     <p:spTree>
@@ -8571,7 +9012,9 @@
           </a:xfrm>
         </p:spPr>
         <p:txBody>
-          <a:bodyPr/>
+          <a:bodyPr>
+            <a:normAutofit fontScale="90000"/>
+          </a:bodyPr>
           <a:lstStyle/>
           <a:p>
             <a:pPr algn="ctr"/>

</xml_diff>